<commit_message>
Cambios ligeros de ortografia y mejoras en graficos
</commit_message>
<xml_diff>
--- a/docs/Comparacion-de-Algoritmos-de-Ordenacion-Merge-Sort-y-Shell-Sort.pptx
+++ b/docs/Comparacion-de-Algoritmos-de-Ordenacion-Merge-Sort-y-Shell-Sort.pptx
@@ -4,6 +4,9 @@
   <p:sldMasterIdLst>
     <p:sldMasterId id="2147483648" r:id="rId1"/>
   </p:sldMasterIdLst>
+  <p:notesMasterIdLst>
+    <p:notesMasterId r:id="rId9"/>
+  </p:notesMasterIdLst>
   <p:sldIdLst>
     <p:sldId id="256" r:id="rId2"/>
     <p:sldId id="257" r:id="rId3"/>
@@ -13,46 +16,270 @@
     <p:sldId id="261" r:id="rId7"/>
     <p:sldId id="262" r:id="rId8"/>
   </p:sldIdLst>
-  <p:notesMasterIdLst>
-    <p:notesMasterId r:id="rId9"/>
-  </p:notesMasterIdLst>
   <p:sldSz cx="14630400" cy="8229600"/>
   <p:notesSz cx="8229600" cy="14630400"/>
   <p:embeddedFontLst>
     <p:embeddedFont>
-      <p:font typeface="Lato"/>
-      <p:regular r:id="rId14"/>
+      <p:font typeface="Lato" panose="020F0502020204030203" pitchFamily="34" charset="0"/>
+      <p:regular r:id="rId10"/>
+      <p:bold r:id="rId11"/>
+      <p:boldItalic r:id="rId12"/>
     </p:embeddedFont>
     <p:embeddedFont>
-      <p:font typeface="Lato"/>
-      <p:regular r:id="rId15"/>
-    </p:embeddedFont>
-    <p:embeddedFont>
-      <p:font typeface="Lato"/>
-      <p:regular r:id="rId16"/>
-    </p:embeddedFont>
-    <p:embeddedFont>
-      <p:font typeface="Lato"/>
-      <p:regular r:id="rId17"/>
-    </p:embeddedFont>
-    <p:embeddedFont>
-      <p:font typeface="Lato"/>
-      <p:regular r:id="rId18"/>
-    </p:embeddedFont>
-    <p:embeddedFont>
-      <p:font typeface="Lato"/>
-      <p:regular r:id="rId19"/>
-    </p:embeddedFont>
-    <p:embeddedFont>
-      <p:font typeface="Lato"/>
-      <p:regular r:id="rId20"/>
-    </p:embeddedFont>
-    <p:embeddedFont>
-      <p:font typeface="Lato"/>
-      <p:regular r:id="rId21"/>
+      <p:font typeface="Lato Bold" panose="020F0502020204030203" pitchFamily="34" charset="0"/>
+      <p:bold r:id="rId13"/>
     </p:embeddedFont>
   </p:embeddedFontLst>
+  <p:defaultTextStyle>
+    <a:defPPr>
+      <a:defRPr lang="es-PE"/>
+    </a:defPPr>
+    <a:lvl1pPr marL="0" algn="l" defTabSz="914400" rtl="0" eaLnBrk="1" latinLnBrk="0" hangingPunct="1">
+      <a:defRPr sz="1800" kern="1200">
+        <a:solidFill>
+          <a:schemeClr val="tx1"/>
+        </a:solidFill>
+        <a:latin typeface="+mn-lt"/>
+        <a:ea typeface="+mn-ea"/>
+        <a:cs typeface="+mn-cs"/>
+      </a:defRPr>
+    </a:lvl1pPr>
+    <a:lvl2pPr marL="457200" algn="l" defTabSz="914400" rtl="0" eaLnBrk="1" latinLnBrk="0" hangingPunct="1">
+      <a:defRPr sz="1800" kern="1200">
+        <a:solidFill>
+          <a:schemeClr val="tx1"/>
+        </a:solidFill>
+        <a:latin typeface="+mn-lt"/>
+        <a:ea typeface="+mn-ea"/>
+        <a:cs typeface="+mn-cs"/>
+      </a:defRPr>
+    </a:lvl2pPr>
+    <a:lvl3pPr marL="914400" algn="l" defTabSz="914400" rtl="0" eaLnBrk="1" latinLnBrk="0" hangingPunct="1">
+      <a:defRPr sz="1800" kern="1200">
+        <a:solidFill>
+          <a:schemeClr val="tx1"/>
+        </a:solidFill>
+        <a:latin typeface="+mn-lt"/>
+        <a:ea typeface="+mn-ea"/>
+        <a:cs typeface="+mn-cs"/>
+      </a:defRPr>
+    </a:lvl3pPr>
+    <a:lvl4pPr marL="1371600" algn="l" defTabSz="914400" rtl="0" eaLnBrk="1" latinLnBrk="0" hangingPunct="1">
+      <a:defRPr sz="1800" kern="1200">
+        <a:solidFill>
+          <a:schemeClr val="tx1"/>
+        </a:solidFill>
+        <a:latin typeface="+mn-lt"/>
+        <a:ea typeface="+mn-ea"/>
+        <a:cs typeface="+mn-cs"/>
+      </a:defRPr>
+    </a:lvl4pPr>
+    <a:lvl5pPr marL="1828800" algn="l" defTabSz="914400" rtl="0" eaLnBrk="1" latinLnBrk="0" hangingPunct="1">
+      <a:defRPr sz="1800" kern="1200">
+        <a:solidFill>
+          <a:schemeClr val="tx1"/>
+        </a:solidFill>
+        <a:latin typeface="+mn-lt"/>
+        <a:ea typeface="+mn-ea"/>
+        <a:cs typeface="+mn-cs"/>
+      </a:defRPr>
+    </a:lvl5pPr>
+    <a:lvl6pPr marL="2286000" algn="l" defTabSz="914400" rtl="0" eaLnBrk="1" latinLnBrk="0" hangingPunct="1">
+      <a:defRPr sz="1800" kern="1200">
+        <a:solidFill>
+          <a:schemeClr val="tx1"/>
+        </a:solidFill>
+        <a:latin typeface="+mn-lt"/>
+        <a:ea typeface="+mn-ea"/>
+        <a:cs typeface="+mn-cs"/>
+      </a:defRPr>
+    </a:lvl6pPr>
+    <a:lvl7pPr marL="2743200" algn="l" defTabSz="914400" rtl="0" eaLnBrk="1" latinLnBrk="0" hangingPunct="1">
+      <a:defRPr sz="1800" kern="1200">
+        <a:solidFill>
+          <a:schemeClr val="tx1"/>
+        </a:solidFill>
+        <a:latin typeface="+mn-lt"/>
+        <a:ea typeface="+mn-ea"/>
+        <a:cs typeface="+mn-cs"/>
+      </a:defRPr>
+    </a:lvl7pPr>
+    <a:lvl8pPr marL="3200400" algn="l" defTabSz="914400" rtl="0" eaLnBrk="1" latinLnBrk="0" hangingPunct="1">
+      <a:defRPr sz="1800" kern="1200">
+        <a:solidFill>
+          <a:schemeClr val="tx1"/>
+        </a:solidFill>
+        <a:latin typeface="+mn-lt"/>
+        <a:ea typeface="+mn-ea"/>
+        <a:cs typeface="+mn-cs"/>
+      </a:defRPr>
+    </a:lvl8pPr>
+    <a:lvl9pPr marL="3657600" algn="l" defTabSz="914400" rtl="0" eaLnBrk="1" latinLnBrk="0" hangingPunct="1">
+      <a:defRPr sz="1800" kern="1200">
+        <a:solidFill>
+          <a:schemeClr val="tx1"/>
+        </a:solidFill>
+        <a:latin typeface="+mn-lt"/>
+        <a:ea typeface="+mn-ea"/>
+        <a:cs typeface="+mn-cs"/>
+      </a:defRPr>
+    </a:lvl9pPr>
+  </p:defaultTextStyle>
+  <p:extLst>
+    <p:ext uri="{EFAFB233-063F-42B5-8137-9DF3F51BA10A}">
+      <p15:sldGuideLst xmlns:p15="http://schemas.microsoft.com/office/powerpoint/2012/main"/>
+    </p:ext>
+  </p:extLst>
 </p:presentation>
+</file>
+
+<file path=ppt/changesInfos/changesInfo1.xml><?xml version="1.0" encoding="utf-8"?>
+<pc:chgInfo xmlns:a="http://schemas.openxmlformats.org/drawingml/2006/main" xmlns:r="http://schemas.openxmlformats.org/officeDocument/2006/relationships" xmlns:ac="http://schemas.microsoft.com/office/drawing/2013/main/command" xmlns:pc="http://schemas.microsoft.com/office/powerpoint/2013/main/command">
+  <pc:docChgLst>
+    <pc:chgData name="Samuel Gómez" userId="a7c75bac940bdb15" providerId="LiveId" clId="{CF9BDFC0-A960-483C-8156-B08C5D73F38E}"/>
+    <pc:docChg chg="modSld">
+      <pc:chgData name="Samuel Gómez" userId="a7c75bac940bdb15" providerId="LiveId" clId="{CF9BDFC0-A960-483C-8156-B08C5D73F38E}" dt="2025-10-19T18:51:06.706" v="85" actId="1076"/>
+      <pc:docMkLst>
+        <pc:docMk/>
+      </pc:docMkLst>
+      <pc:sldChg chg="addSp modSp mod">
+        <pc:chgData name="Samuel Gómez" userId="a7c75bac940bdb15" providerId="LiveId" clId="{CF9BDFC0-A960-483C-8156-B08C5D73F38E}" dt="2025-10-19T18:51:06.706" v="85" actId="1076"/>
+        <pc:sldMkLst>
+          <pc:docMk/>
+          <pc:sldMk cId="0" sldId="260"/>
+        </pc:sldMkLst>
+        <pc:spChg chg="mod">
+          <ac:chgData name="Samuel Gómez" userId="a7c75bac940bdb15" providerId="LiveId" clId="{CF9BDFC0-A960-483C-8156-B08C5D73F38E}" dt="2025-10-19T18:48:33.405" v="46" actId="1076"/>
+          <ac:spMkLst>
+            <pc:docMk/>
+            <pc:sldMk cId="0" sldId="260"/>
+            <ac:spMk id="2" creationId="{00000000-0000-0000-0000-000000000000}"/>
+          </ac:spMkLst>
+        </pc:spChg>
+        <pc:spChg chg="mod">
+          <ac:chgData name="Samuel Gómez" userId="a7c75bac940bdb15" providerId="LiveId" clId="{CF9BDFC0-A960-483C-8156-B08C5D73F38E}" dt="2025-10-19T18:49:00.584" v="57" actId="1076"/>
+          <ac:spMkLst>
+            <pc:docMk/>
+            <pc:sldMk cId="0" sldId="260"/>
+            <ac:spMk id="3" creationId="{00000000-0000-0000-0000-000000000000}"/>
+          </ac:spMkLst>
+        </pc:spChg>
+        <pc:spChg chg="mod">
+          <ac:chgData name="Samuel Gómez" userId="a7c75bac940bdb15" providerId="LiveId" clId="{CF9BDFC0-A960-483C-8156-B08C5D73F38E}" dt="2025-10-19T18:49:29.125" v="67" actId="1076"/>
+          <ac:spMkLst>
+            <pc:docMk/>
+            <pc:sldMk cId="0" sldId="260"/>
+            <ac:spMk id="4" creationId="{00000000-0000-0000-0000-000000000000}"/>
+          </ac:spMkLst>
+        </pc:spChg>
+        <pc:spChg chg="mod">
+          <ac:chgData name="Samuel Gómez" userId="a7c75bac940bdb15" providerId="LiveId" clId="{CF9BDFC0-A960-483C-8156-B08C5D73F38E}" dt="2025-10-19T18:49:39.423" v="69" actId="1076"/>
+          <ac:spMkLst>
+            <pc:docMk/>
+            <pc:sldMk cId="0" sldId="260"/>
+            <ac:spMk id="6" creationId="{00000000-0000-0000-0000-000000000000}"/>
+          </ac:spMkLst>
+        </pc:spChg>
+        <pc:spChg chg="mod">
+          <ac:chgData name="Samuel Gómez" userId="a7c75bac940bdb15" providerId="LiveId" clId="{CF9BDFC0-A960-483C-8156-B08C5D73F38E}" dt="2025-10-19T18:49:52.992" v="74" actId="1076"/>
+          <ac:spMkLst>
+            <pc:docMk/>
+            <pc:sldMk cId="0" sldId="260"/>
+            <ac:spMk id="7" creationId="{00000000-0000-0000-0000-000000000000}"/>
+          </ac:spMkLst>
+        </pc:spChg>
+        <pc:spChg chg="mod">
+          <ac:chgData name="Samuel Gómez" userId="a7c75bac940bdb15" providerId="LiveId" clId="{CF9BDFC0-A960-483C-8156-B08C5D73F38E}" dt="2025-10-19T18:49:44.329" v="71" actId="1076"/>
+          <ac:spMkLst>
+            <pc:docMk/>
+            <pc:sldMk cId="0" sldId="260"/>
+            <ac:spMk id="8" creationId="{00000000-0000-0000-0000-000000000000}"/>
+          </ac:spMkLst>
+        </pc:spChg>
+        <pc:spChg chg="mod">
+          <ac:chgData name="Samuel Gómez" userId="a7c75bac940bdb15" providerId="LiveId" clId="{CF9BDFC0-A960-483C-8156-B08C5D73F38E}" dt="2025-10-19T18:49:58.423" v="75" actId="1076"/>
+          <ac:spMkLst>
+            <pc:docMk/>
+            <pc:sldMk cId="0" sldId="260"/>
+            <ac:spMk id="10" creationId="{00000000-0000-0000-0000-000000000000}"/>
+          </ac:spMkLst>
+        </pc:spChg>
+        <pc:spChg chg="mod">
+          <ac:chgData name="Samuel Gómez" userId="a7c75bac940bdb15" providerId="LiveId" clId="{CF9BDFC0-A960-483C-8156-B08C5D73F38E}" dt="2025-10-19T18:49:25.064" v="66" actId="1076"/>
+          <ac:spMkLst>
+            <pc:docMk/>
+            <pc:sldMk cId="0" sldId="260"/>
+            <ac:spMk id="11" creationId="{00000000-0000-0000-0000-000000000000}"/>
+          </ac:spMkLst>
+        </pc:spChg>
+        <pc:spChg chg="mod">
+          <ac:chgData name="Samuel Gómez" userId="a7c75bac940bdb15" providerId="LiveId" clId="{CF9BDFC0-A960-483C-8156-B08C5D73F38E}" dt="2025-10-19T18:50:09.485" v="78" actId="1076"/>
+          <ac:spMkLst>
+            <pc:docMk/>
+            <pc:sldMk cId="0" sldId="260"/>
+            <ac:spMk id="12" creationId="{00000000-0000-0000-0000-000000000000}"/>
+          </ac:spMkLst>
+        </pc:spChg>
+        <pc:spChg chg="mod">
+          <ac:chgData name="Samuel Gómez" userId="a7c75bac940bdb15" providerId="LiveId" clId="{CF9BDFC0-A960-483C-8156-B08C5D73F38E}" dt="2025-10-19T18:50:15.505" v="80" actId="1076"/>
+          <ac:spMkLst>
+            <pc:docMk/>
+            <pc:sldMk cId="0" sldId="260"/>
+            <ac:spMk id="14" creationId="{00000000-0000-0000-0000-000000000000}"/>
+          </ac:spMkLst>
+        </pc:spChg>
+        <pc:picChg chg="mod">
+          <ac:chgData name="Samuel Gómez" userId="a7c75bac940bdb15" providerId="LiveId" clId="{CF9BDFC0-A960-483C-8156-B08C5D73F38E}" dt="2025-10-19T18:49:36.161" v="68" actId="1076"/>
+          <ac:picMkLst>
+            <pc:docMk/>
+            <pc:sldMk cId="0" sldId="260"/>
+            <ac:picMk id="5" creationId="{00000000-0000-0000-0000-000000000000}"/>
+          </ac:picMkLst>
+        </pc:picChg>
+        <pc:picChg chg="mod">
+          <ac:chgData name="Samuel Gómez" userId="a7c75bac940bdb15" providerId="LiveId" clId="{CF9BDFC0-A960-483C-8156-B08C5D73F38E}" dt="2025-10-19T18:49:47.656" v="72" actId="1076"/>
+          <ac:picMkLst>
+            <pc:docMk/>
+            <pc:sldMk cId="0" sldId="260"/>
+            <ac:picMk id="9" creationId="{00000000-0000-0000-0000-000000000000}"/>
+          </ac:picMkLst>
+        </pc:picChg>
+        <pc:picChg chg="mod">
+          <ac:chgData name="Samuel Gómez" userId="a7c75bac940bdb15" providerId="LiveId" clId="{CF9BDFC0-A960-483C-8156-B08C5D73F38E}" dt="2025-10-19T18:50:12.321" v="79" actId="1076"/>
+          <ac:picMkLst>
+            <pc:docMk/>
+            <pc:sldMk cId="0" sldId="260"/>
+            <ac:picMk id="13" creationId="{00000000-0000-0000-0000-000000000000}"/>
+          </ac:picMkLst>
+        </pc:picChg>
+        <pc:picChg chg="add mod">
+          <ac:chgData name="Samuel Gómez" userId="a7c75bac940bdb15" providerId="LiveId" clId="{CF9BDFC0-A960-483C-8156-B08C5D73F38E}" dt="2025-10-19T18:49:41.316" v="70" actId="1076"/>
+          <ac:picMkLst>
+            <pc:docMk/>
+            <pc:sldMk cId="0" sldId="260"/>
+            <ac:picMk id="16" creationId="{CF994A75-0FA0-9CA6-0C89-6977FF1513B0}"/>
+          </ac:picMkLst>
+        </pc:picChg>
+        <pc:picChg chg="add mod">
+          <ac:chgData name="Samuel Gómez" userId="a7c75bac940bdb15" providerId="LiveId" clId="{CF9BDFC0-A960-483C-8156-B08C5D73F38E}" dt="2025-10-19T18:50:03.959" v="77" actId="14100"/>
+          <ac:picMkLst>
+            <pc:docMk/>
+            <pc:sldMk cId="0" sldId="260"/>
+            <ac:picMk id="18" creationId="{12132392-6AD0-8AA5-6C4A-E5514EAC7710}"/>
+          </ac:picMkLst>
+        </pc:picChg>
+        <pc:picChg chg="add mod">
+          <ac:chgData name="Samuel Gómez" userId="a7c75bac940bdb15" providerId="LiveId" clId="{CF9BDFC0-A960-483C-8156-B08C5D73F38E}" dt="2025-10-19T18:51:06.706" v="85" actId="1076"/>
+          <ac:picMkLst>
+            <pc:docMk/>
+            <pc:sldMk cId="0" sldId="260"/>
+            <ac:picMk id="20" creationId="{DCFC0495-16E9-6BFD-F90B-0C223F6534F4}"/>
+          </ac:picMkLst>
+        </pc:picChg>
+      </pc:sldChg>
+    </pc:docChg>
+  </pc:docChgLst>
+</pc:chgInfo>
 </file>
 
 <file path=ppt/notesMasters/notesMaster1.xml><?xml version="1.0" encoding="utf-8"?>
@@ -77,234 +304,10 @@
           <a:chExt cx="0" cy="0"/>
         </a:xfrm>
       </p:grpSpPr>
-      <p:sp>
-        <p:nvSpPr>
-          <p:cNvPr id="2" name="Header Placeholder 1"/>
-          <p:cNvSpPr>
-            <a:spLocks noGrp="1"/>
-          </p:cNvSpPr>
-          <p:nvPr>
-            <p:ph type="hdr" sz="quarter"/>
-          </p:nvPr>
-        </p:nvSpPr>
-        <p:spPr>
-          <a:xfrm>
-            <a:off x="0" y="0"/>
-            <a:ext cx="2971800" cy="458788"/>
-          </a:xfrm>
-          <a:prstGeom prst="rect">
-            <a:avLst/>
-          </a:prstGeom>
-        </p:spPr>
-        <p:txBody>
-          <a:bodyPr vert="horz" lIns="91440" tIns="45720" rIns="91440" bIns="45720" rtlCol="0"/>
-          <a:lstStyle>
-            <a:lvl1pPr algn="l">
-              <a:defRPr sz="1200"/>
-            </a:lvl1pPr>
-          </a:lstStyle>
-          <a:p>
-            <a:endParaRPr lang="en-US"/>
-          </a:p>
-        </p:txBody>
-      </p:sp>
-      <p:sp>
-        <p:nvSpPr>
-          <p:cNvPr id="3" name="Date Placeholder 2"/>
-          <p:cNvSpPr>
-            <a:spLocks noGrp="1"/>
-          </p:cNvSpPr>
-          <p:nvPr>
-            <p:ph type="dt" idx="1"/>
-          </p:nvPr>
-        </p:nvSpPr>
-        <p:spPr>
-          <a:xfrm>
-            <a:off x="3884613" y="0"/>
-            <a:ext cx="2971800" cy="458788"/>
-          </a:xfrm>
-          <a:prstGeom prst="rect">
-            <a:avLst/>
-          </a:prstGeom>
-        </p:spPr>
-        <p:txBody>
-          <a:bodyPr vert="horz" lIns="91440" tIns="45720" rIns="91440" bIns="45720" rtlCol="0"/>
-          <a:lstStyle>
-            <a:lvl1pPr algn="r">
-              <a:defRPr sz="1200"/>
-            </a:lvl1pPr>
-          </a:lstStyle>
-          <a:p>
-            <a:fld id="{5282F153-3F37-0F45-9E97-73ACFA13230C}" type="datetimeFigureOut">
-              <a:rPr lang="en-US"/>
-              <a:t>7/23/19</a:t>
-            </a:fld>
-            <a:endParaRPr lang="en-US"/>
-          </a:p>
-        </p:txBody>
-      </p:sp>
-      <p:sp>
-        <p:nvSpPr>
-          <p:cNvPr id="4" name="Slide Image Placeholder 3"/>
-          <p:cNvSpPr>
-            <a:spLocks noGrp="1" noRot="1" noChangeAspect="1"/>
-          </p:cNvSpPr>
-          <p:nvPr>
-            <p:ph type="sldImg" idx="2"/>
-          </p:nvPr>
-        </p:nvSpPr>
-        <p:spPr>
-          <a:xfrm>
-            <a:off x="685800" y="1143000"/>
-            <a:ext cx="5486400" cy="3086100"/>
-          </a:xfrm>
-          <a:prstGeom prst="rect">
-            <a:avLst/>
-          </a:prstGeom>
-          <a:noFill/>
-          <a:ln w="12700">
-            <a:solidFill>
-              <a:prstClr val="black"/>
-            </a:solidFill>
-          </a:ln>
-        </p:spPr>
-        <p:txBody>
-          <a:bodyPr vert="horz" lIns="91440" tIns="45720" rIns="91440" bIns="45720" rtlCol="0" anchor="ctr"/>
-          <a:lstStyle/>
-          <a:p>
-            <a:endParaRPr lang="en-US"/>
-          </a:p>
-        </p:txBody>
-      </p:sp>
-      <p:sp>
-        <p:nvSpPr>
-          <p:cNvPr id="5" name="Notes Placeholder 4"/>
-          <p:cNvSpPr>
-            <a:spLocks noGrp="1"/>
-          </p:cNvSpPr>
-          <p:nvPr>
-            <p:ph type="body" sz="quarter" idx="3"/>
-          </p:nvPr>
-        </p:nvSpPr>
-        <p:spPr>
-          <a:xfrm>
-            <a:off x="685800" y="4400550"/>
-            <a:ext cx="5486400" cy="3600450"/>
-          </a:xfrm>
-          <a:prstGeom prst="rect">
-            <a:avLst/>
-          </a:prstGeom>
-        </p:spPr>
-        <p:txBody>
-          <a:bodyPr vert="horz" lIns="91440" tIns="45720" rIns="91440" bIns="45720" rtlCol="0"/>
-          <a:lstStyle/>
-          <a:p>
-            <a:pPr lvl="0"/>
-            <a:r>
-              <a:rPr lang="en-US"/>
-              <a:t>Click to edit Master text styles</a:t>
-            </a:r>
-          </a:p>
-          <a:p>
-            <a:pPr lvl="1"/>
-            <a:r>
-              <a:rPr lang="en-US"/>
-              <a:t>Second level</a:t>
-            </a:r>
-          </a:p>
-          <a:p>
-            <a:pPr lvl="2"/>
-            <a:r>
-              <a:rPr lang="en-US"/>
-              <a:t>Third level</a:t>
-            </a:r>
-          </a:p>
-          <a:p>
-            <a:pPr lvl="3"/>
-            <a:r>
-              <a:rPr lang="en-US"/>
-              <a:t>Fourth level</a:t>
-            </a:r>
-          </a:p>
-          <a:p>
-            <a:pPr lvl="4"/>
-            <a:r>
-              <a:rPr lang="en-US"/>
-              <a:t>Fifth level</a:t>
-            </a:r>
-          </a:p>
-        </p:txBody>
-      </p:sp>
-      <p:sp>
-        <p:nvSpPr>
-          <p:cNvPr id="6" name="Footer Placeholder 5"/>
-          <p:cNvSpPr>
-            <a:spLocks noGrp="1"/>
-          </p:cNvSpPr>
-          <p:nvPr>
-            <p:ph type="ftr" sz="quarter" idx="4"/>
-          </p:nvPr>
-        </p:nvSpPr>
-        <p:spPr>
-          <a:xfrm>
-            <a:off x="0" y="8685213"/>
-            <a:ext cx="2971800" cy="458787"/>
-          </a:xfrm>
-          <a:prstGeom prst="rect">
-            <a:avLst/>
-          </a:prstGeom>
-        </p:spPr>
-        <p:txBody>
-          <a:bodyPr vert="horz" lIns="91440" tIns="45720" rIns="91440" bIns="45720" rtlCol="0" anchor="b"/>
-          <a:lstStyle>
-            <a:lvl1pPr algn="l">
-              <a:defRPr sz="1200"/>
-            </a:lvl1pPr>
-          </a:lstStyle>
-          <a:p>
-            <a:endParaRPr lang="en-US"/>
-          </a:p>
-        </p:txBody>
-      </p:sp>
-      <p:sp>
-        <p:nvSpPr>
-          <p:cNvPr id="7" name="Slide Number Placeholder 6"/>
-          <p:cNvSpPr>
-            <a:spLocks noGrp="1"/>
-          </p:cNvSpPr>
-          <p:nvPr>
-            <p:ph type="sldNum" sz="quarter" idx="5"/>
-          </p:nvPr>
-        </p:nvSpPr>
-        <p:spPr>
-          <a:xfrm>
-            <a:off x="3884613" y="8685213"/>
-            <a:ext cx="2971800" cy="458787"/>
-          </a:xfrm>
-          <a:prstGeom prst="rect">
-            <a:avLst/>
-          </a:prstGeom>
-        </p:spPr>
-        <p:txBody>
-          <a:bodyPr vert="horz" lIns="91440" tIns="45720" rIns="91440" bIns="45720" rtlCol="0" anchor="b"/>
-          <a:lstStyle>
-            <a:lvl1pPr algn="r">
-              <a:defRPr sz="1200"/>
-            </a:lvl1pPr>
-          </a:lstStyle>
-          <a:p>
-            <a:fld id="{CE5E9CC1-C706-0F49-92D6-E571CC5EEA8F}" type="slidenum">
-              <a:rPr lang="en-US"/>
-              <a:t>‹#›</a:t>
-            </a:fld>
-            <a:endParaRPr lang="en-US"/>
-          </a:p>
-        </p:txBody>
-      </p:sp>
     </p:spTree>
     <p:extLst>
       <p:ext uri="{BB962C8B-B14F-4D97-AF65-F5344CB8AC3E}">
-        <p14:creationId xmlns:p14="http://schemas.microsoft.com/office/powerpoint/2010/main" val="1024086991"/>
+        <p14:creationId xmlns:p14="http://schemas.microsoft.com/office/powerpoint/2010/main" val="134343217"/>
       </p:ext>
     </p:extLst>
   </p:cSld>
@@ -448,10 +451,6 @@
           <a:bodyPr/>
           <a:lstStyle/>
           <a:p>
-            <a:r>
-              <a:rPr lang="en-US" dirty="0"/>
-              <a:t/>
-            </a:r>
             <a:endParaRPr lang="en-US" dirty="0"/>
           </a:p>
         </p:txBody>
@@ -536,10 +535,6 @@
           <a:bodyPr/>
           <a:lstStyle/>
           <a:p>
-            <a:r>
-              <a:rPr lang="en-US" dirty="0"/>
-              <a:t/>
-            </a:r>
             <a:endParaRPr lang="en-US" dirty="0"/>
           </a:p>
         </p:txBody>
@@ -624,10 +619,6 @@
           <a:bodyPr/>
           <a:lstStyle/>
           <a:p>
-            <a:r>
-              <a:rPr lang="en-US" dirty="0"/>
-              <a:t/>
-            </a:r>
             <a:endParaRPr lang="en-US" dirty="0"/>
           </a:p>
         </p:txBody>
@@ -712,10 +703,6 @@
           <a:bodyPr/>
           <a:lstStyle/>
           <a:p>
-            <a:r>
-              <a:rPr lang="en-US" dirty="0"/>
-              <a:t/>
-            </a:r>
             <a:endParaRPr lang="en-US" dirty="0"/>
           </a:p>
         </p:txBody>
@@ -800,10 +787,6 @@
           <a:bodyPr/>
           <a:lstStyle/>
           <a:p>
-            <a:r>
-              <a:rPr lang="en-US" dirty="0"/>
-              <a:t/>
-            </a:r>
             <a:endParaRPr lang="en-US" dirty="0"/>
           </a:p>
         </p:txBody>
@@ -888,10 +871,6 @@
           <a:bodyPr/>
           <a:lstStyle/>
           <a:p>
-            <a:r>
-              <a:rPr lang="en-US" dirty="0"/>
-              <a:t/>
-            </a:r>
             <a:endParaRPr lang="en-US" dirty="0"/>
           </a:p>
         </p:txBody>
@@ -976,10 +955,6 @@
           <a:bodyPr/>
           <a:lstStyle/>
           <a:p>
-            <a:r>
-              <a:rPr lang="en-US" dirty="0"/>
-              <a:t/>
-            </a:r>
             <a:endParaRPr lang="en-US" dirty="0"/>
           </a:p>
         </p:txBody>
@@ -1058,6 +1033,7 @@
         <a:solidFill>
           <a:srgbClr val="000000"/>
         </a:solidFill>
+        <a:effectLst/>
       </p:bgPr>
     </p:bg>
     <p:spTree>
@@ -1117,7 +1093,7 @@
       <p:pic>
         <p:nvPicPr>
           <p:cNvPr id="4" name="Image 0" descr="preencoded.png">
-            <a:hlinkClick r:id="rId2" tooltip=""/>
+            <a:hlinkClick r:id="rId2"/>
           </p:cNvPr>
           <p:cNvPicPr>
             <a:picLocks noChangeAspect="1"/>
@@ -1125,7 +1101,7 @@
           <p:nvPr/>
         </p:nvPicPr>
         <p:blipFill>
-          <a:blip r:embed="rId1"/>
+          <a:blip r:embed="rId3"/>
           <a:stretch>
             <a:fillRect/>
           </a:stretch>
@@ -1156,6 +1132,7 @@
         <a:solidFill>
           <a:srgbClr val="000000"/>
         </a:solidFill>
+        <a:effectLst/>
       </p:bgPr>
     </p:bg>
     <p:spTree>
@@ -1215,7 +1192,7 @@
       <p:pic>
         <p:nvPicPr>
           <p:cNvPr id="4" name="Image 0" descr="preencoded.png">
-            <a:hlinkClick r:id="rId2" tooltip=""/>
+            <a:hlinkClick r:id="rId2"/>
           </p:cNvPr>
           <p:cNvPicPr>
             <a:picLocks noChangeAspect="1"/>
@@ -1223,7 +1200,7 @@
           <p:nvPr/>
         </p:nvPicPr>
         <p:blipFill>
-          <a:blip r:embed="rId1"/>
+          <a:blip r:embed="rId3"/>
           <a:stretch>
             <a:fillRect/>
           </a:stretch>
@@ -1254,6 +1231,7 @@
         <a:solidFill>
           <a:srgbClr val="000000"/>
         </a:solidFill>
+        <a:effectLst/>
       </p:bgPr>
     </p:bg>
     <p:spTree>
@@ -1313,7 +1291,7 @@
       <p:pic>
         <p:nvPicPr>
           <p:cNvPr id="4" name="Image 0" descr="preencoded.png">
-            <a:hlinkClick r:id="rId2" tooltip=""/>
+            <a:hlinkClick r:id="rId2"/>
           </p:cNvPr>
           <p:cNvPicPr>
             <a:picLocks noChangeAspect="1"/>
@@ -1321,7 +1299,7 @@
           <p:nvPr/>
         </p:nvPicPr>
         <p:blipFill>
-          <a:blip r:embed="rId1"/>
+          <a:blip r:embed="rId3"/>
           <a:stretch>
             <a:fillRect/>
           </a:stretch>
@@ -1352,6 +1330,7 @@
         <a:solidFill>
           <a:srgbClr val="000000"/>
         </a:solidFill>
+        <a:effectLst/>
       </p:bgPr>
     </p:bg>
     <p:spTree>
@@ -1411,7 +1390,7 @@
       <p:pic>
         <p:nvPicPr>
           <p:cNvPr id="4" name="Image 0" descr="preencoded.png">
-            <a:hlinkClick r:id="rId2" tooltip=""/>
+            <a:hlinkClick r:id="rId2"/>
           </p:cNvPr>
           <p:cNvPicPr>
             <a:picLocks noChangeAspect="1"/>
@@ -1419,7 +1398,7 @@
           <p:nvPr/>
         </p:nvPicPr>
         <p:blipFill>
-          <a:blip r:embed="rId1"/>
+          <a:blip r:embed="rId3"/>
           <a:stretch>
             <a:fillRect/>
           </a:stretch>
@@ -1450,6 +1429,7 @@
         <a:solidFill>
           <a:srgbClr val="000000"/>
         </a:solidFill>
+        <a:effectLst/>
       </p:bgPr>
     </p:bg>
     <p:spTree>
@@ -1509,7 +1489,7 @@
       <p:pic>
         <p:nvPicPr>
           <p:cNvPr id="4" name="Image 0" descr="preencoded.png">
-            <a:hlinkClick r:id="rId2" tooltip=""/>
+            <a:hlinkClick r:id="rId2"/>
           </p:cNvPr>
           <p:cNvPicPr>
             <a:picLocks noChangeAspect="1"/>
@@ -1517,7 +1497,7 @@
           <p:nvPr/>
         </p:nvPicPr>
         <p:blipFill>
-          <a:blip r:embed="rId1"/>
+          <a:blip r:embed="rId3"/>
           <a:stretch>
             <a:fillRect/>
           </a:stretch>
@@ -1548,6 +1528,7 @@
         <a:solidFill>
           <a:srgbClr val="000000"/>
         </a:solidFill>
+        <a:effectLst/>
       </p:bgPr>
     </p:bg>
     <p:spTree>
@@ -1607,7 +1588,7 @@
       <p:pic>
         <p:nvPicPr>
           <p:cNvPr id="4" name="Image 0" descr="preencoded.png">
-            <a:hlinkClick r:id="rId2" tooltip=""/>
+            <a:hlinkClick r:id="rId2"/>
           </p:cNvPr>
           <p:cNvPicPr>
             <a:picLocks noChangeAspect="1"/>
@@ -1615,7 +1596,7 @@
           <p:nvPr/>
         </p:nvPicPr>
         <p:blipFill>
-          <a:blip r:embed="rId1"/>
+          <a:blip r:embed="rId3"/>
           <a:stretch>
             <a:fillRect/>
           </a:stretch>
@@ -1646,6 +1627,7 @@
         <a:solidFill>
           <a:srgbClr val="000000"/>
         </a:solidFill>
+        <a:effectLst/>
       </p:bgPr>
     </p:bg>
     <p:spTree>
@@ -1705,7 +1687,7 @@
       <p:pic>
         <p:nvPicPr>
           <p:cNvPr id="4" name="Image 0" descr="preencoded.png">
-            <a:hlinkClick r:id="rId2" tooltip=""/>
+            <a:hlinkClick r:id="rId2"/>
           </p:cNvPr>
           <p:cNvPicPr>
             <a:picLocks noChangeAspect="1"/>
@@ -1713,7 +1695,7 @@
           <p:nvPr/>
         </p:nvPicPr>
         <p:blipFill>
-          <a:blip r:embed="rId1"/>
+          <a:blip r:embed="rId3"/>
           <a:stretch>
             <a:fillRect/>
           </a:stretch>
@@ -1739,6 +1721,11 @@
 <file path=ppt/slideMasters/slideMaster1.xml><?xml version="1.0" encoding="utf-8"?>
 <p:sldMaster xmlns:a="http://schemas.openxmlformats.org/drawingml/2006/main" xmlns:r="http://schemas.openxmlformats.org/officeDocument/2006/relationships" xmlns:p="http://schemas.openxmlformats.org/presentationml/2006/main">
   <p:cSld>
+    <p:bg>
+      <p:bgRef idx="1001">
+        <a:schemeClr val="bg1"/>
+      </p:bgRef>
+    </p:bg>
     <p:spTree>
       <p:nvGrpSpPr>
         <p:cNvPr id="1" name=""/>
@@ -2039,14 +2026,14 @@
       </p:grpSpPr>
       <p:pic>
         <p:nvPicPr>
-          <p:cNvPr id="2" name="Image 0" descr="preencoded.png">    </p:cNvPr>
+          <p:cNvPr id="2" name="Image 0" descr="preencoded.png"/>
           <p:cNvPicPr>
             <a:picLocks noChangeAspect="1"/>
           </p:cNvPicPr>
           <p:nvPr/>
         </p:nvPicPr>
         <p:blipFill>
-          <a:blip r:embed="rId1"/>
+          <a:blip r:embed="rId3"/>
           <a:stretch>
             <a:fillRect/>
           </a:stretch>
@@ -2082,7 +2069,7 @@
           <a:bodyPr wrap="square" lIns="0" tIns="0" rIns="0" bIns="0" rtlCol="0" anchor="t"/>
           <a:lstStyle/>
           <a:p>
-            <a:pPr algn="l" indent="0" marL="0">
+            <a:pPr marL="0" indent="0" algn="l">
               <a:lnSpc>
                 <a:spcPts val="5550"/>
               </a:lnSpc>
@@ -2124,7 +2111,7 @@
           <a:bodyPr wrap="square" lIns="0" tIns="0" rIns="0" bIns="0" rtlCol="0" anchor="t"/>
           <a:lstStyle/>
           <a:p>
-            <a:pPr algn="l" indent="0" marL="0">
+            <a:pPr marL="0" indent="0" algn="l">
               <a:lnSpc>
                 <a:spcPts val="3550"/>
               </a:lnSpc>
@@ -2191,7 +2178,7 @@
           <a:bodyPr wrap="none" lIns="0" tIns="0" rIns="0" bIns="0" rtlCol="0" anchor="t"/>
           <a:lstStyle/>
           <a:p>
-            <a:pPr algn="l" indent="0" marL="0">
+            <a:pPr marL="0" indent="0" algn="l">
               <a:lnSpc>
                 <a:spcPts val="5550"/>
               </a:lnSpc>
@@ -2280,17 +2267,17 @@
       </p:sp>
       <p:pic>
         <p:nvPicPr>
-          <p:cNvPr id="6" name="Image 0" descr="preencoded.png">    </p:cNvPr>
+          <p:cNvPr id="6" name="Image 0" descr="preencoded.png"/>
           <p:cNvPicPr>
             <a:picLocks noChangeAspect="1"/>
           </p:cNvPicPr>
           <p:nvPr/>
         </p:nvPicPr>
         <p:blipFill>
-          <a:blip r:embed="rId1">
+          <a:blip r:embed="rId3">
             <a:extLst>
               <a:ext uri="{96DAC541-7B7A-43D3-8B79-37D633B846F1}">
-                <asvg:svgBlip xmlns:asvg="http://schemas.microsoft.com/office/drawing/2016/SVG/main" r:embed="rId2"/>
+                <asvg:svgBlip xmlns:asvg="http://schemas.microsoft.com/office/drawing/2016/SVG/main" r:embed="rId4"/>
               </a:ext>
             </a:extLst>
           </a:blip>
@@ -2329,7 +2316,7 @@
           <a:bodyPr wrap="square" lIns="0" tIns="0" rIns="0" bIns="0" rtlCol="0" anchor="t"/>
           <a:lstStyle/>
           <a:p>
-            <a:pPr algn="l" indent="0" marL="0">
+            <a:pPr marL="0" indent="0" algn="l">
               <a:lnSpc>
                 <a:spcPts val="2750"/>
               </a:lnSpc>
@@ -2418,17 +2405,17 @@
       </p:sp>
       <p:pic>
         <p:nvPicPr>
-          <p:cNvPr id="11" name="Image 1" descr="preencoded.png">    </p:cNvPr>
+          <p:cNvPr id="11" name="Image 1" descr="preencoded.png"/>
           <p:cNvPicPr>
             <a:picLocks noChangeAspect="1"/>
           </p:cNvPicPr>
           <p:nvPr/>
         </p:nvPicPr>
         <p:blipFill>
-          <a:blip r:embed="rId3">
+          <a:blip r:embed="rId5">
             <a:extLst>
               <a:ext uri="{96DAC541-7B7A-43D3-8B79-37D633B846F1}">
-                <asvg:svgBlip xmlns:asvg="http://schemas.microsoft.com/office/drawing/2016/SVG/main" r:embed="rId4"/>
+                <asvg:svgBlip xmlns:asvg="http://schemas.microsoft.com/office/drawing/2016/SVG/main" r:embed="rId6"/>
               </a:ext>
             </a:extLst>
           </a:blip>
@@ -2467,7 +2454,7 @@
           <a:bodyPr wrap="square" lIns="0" tIns="0" rIns="0" bIns="0" rtlCol="0" anchor="t"/>
           <a:lstStyle/>
           <a:p>
-            <a:pPr algn="l" indent="0" marL="0">
+            <a:pPr marL="0" indent="0" algn="l">
               <a:lnSpc>
                 <a:spcPts val="2750"/>
               </a:lnSpc>
@@ -2556,17 +2543,17 @@
       </p:sp>
       <p:pic>
         <p:nvPicPr>
-          <p:cNvPr id="16" name="Image 2" descr="preencoded.png">    </p:cNvPr>
+          <p:cNvPr id="16" name="Image 2" descr="preencoded.png"/>
           <p:cNvPicPr>
             <a:picLocks noChangeAspect="1"/>
           </p:cNvPicPr>
           <p:nvPr/>
         </p:nvPicPr>
         <p:blipFill>
-          <a:blip r:embed="rId5">
+          <a:blip r:embed="rId7">
             <a:extLst>
               <a:ext uri="{96DAC541-7B7A-43D3-8B79-37D633B846F1}">
-                <asvg:svgBlip xmlns:asvg="http://schemas.microsoft.com/office/drawing/2016/SVG/main" r:embed="rId6"/>
+                <asvg:svgBlip xmlns:asvg="http://schemas.microsoft.com/office/drawing/2016/SVG/main" r:embed="rId8"/>
               </a:ext>
             </a:extLst>
           </a:blip>
@@ -2605,7 +2592,7 @@
           <a:bodyPr wrap="square" lIns="0" tIns="0" rIns="0" bIns="0" rtlCol="0" anchor="t"/>
           <a:lstStyle/>
           <a:p>
-            <a:pPr algn="l" indent="0" marL="0">
+            <a:pPr marL="0" indent="0" algn="l">
               <a:lnSpc>
                 <a:spcPts val="2750"/>
               </a:lnSpc>
@@ -2672,7 +2659,7 @@
           <a:bodyPr wrap="none" lIns="0" tIns="0" rIns="0" bIns="0" rtlCol="0" anchor="t"/>
           <a:lstStyle/>
           <a:p>
-            <a:pPr algn="l" indent="0" marL="0">
+            <a:pPr marL="0" indent="0" algn="l">
               <a:lnSpc>
                 <a:spcPts val="5550"/>
               </a:lnSpc>
@@ -2714,7 +2701,7 @@
           <a:bodyPr wrap="square" lIns="0" tIns="0" rIns="0" bIns="0" rtlCol="0" anchor="t"/>
           <a:lstStyle/>
           <a:p>
-            <a:pPr algn="l" indent="0" marL="0">
+            <a:pPr marL="0" indent="0" algn="l">
               <a:lnSpc>
                 <a:spcPts val="2750"/>
               </a:lnSpc>
@@ -2756,7 +2743,7 @@
           <a:bodyPr wrap="square" lIns="0" tIns="0" rIns="0" bIns="0" rtlCol="0" anchor="t"/>
           <a:lstStyle/>
           <a:p>
-            <a:pPr algn="l" indent="0" marL="0">
+            <a:pPr marL="0" indent="0" algn="l">
               <a:lnSpc>
                 <a:spcPts val="2750"/>
               </a:lnSpc>
@@ -2779,14 +2766,14 @@
       </p:sp>
       <p:pic>
         <p:nvPicPr>
-          <p:cNvPr id="5" name="Image 0" descr="preencoded.png">    </p:cNvPr>
+          <p:cNvPr id="5" name="Image 0" descr="preencoded.png"/>
           <p:cNvPicPr>
             <a:picLocks noChangeAspect="1"/>
           </p:cNvPicPr>
           <p:nvPr/>
         </p:nvPicPr>
         <p:blipFill>
-          <a:blip r:embed="rId1"/>
+          <a:blip r:embed="rId3"/>
           <a:stretch>
             <a:fillRect/>
           </a:stretch>
@@ -2847,7 +2834,7 @@
           <a:bodyPr wrap="none" lIns="0" tIns="0" rIns="0" bIns="0" rtlCol="0" anchor="t"/>
           <a:lstStyle/>
           <a:p>
-            <a:pPr algn="l" indent="0" marL="0">
+            <a:pPr marL="0" indent="0" algn="l">
               <a:lnSpc>
                 <a:spcPts val="4150"/>
               </a:lnSpc>
@@ -2870,14 +2857,14 @@
       </p:sp>
       <p:pic>
         <p:nvPicPr>
-          <p:cNvPr id="3" name="Image 0" descr="preencoded.png">    </p:cNvPr>
+          <p:cNvPr id="3" name="Image 0" descr="preencoded.png"/>
           <p:cNvPicPr>
             <a:picLocks noChangeAspect="1"/>
           </p:cNvPicPr>
           <p:nvPr/>
         </p:nvPicPr>
         <p:blipFill>
-          <a:blip r:embed="rId1"/>
+          <a:blip r:embed="rId3"/>
           <a:stretch>
             <a:fillRect/>
           </a:stretch>
@@ -2913,7 +2900,7 @@
           <a:bodyPr wrap="none" lIns="0" tIns="0" rIns="0" bIns="0" rtlCol="0" anchor="t"/>
           <a:lstStyle/>
           <a:p>
-            <a:pPr algn="l" indent="0" marL="0">
+            <a:pPr marL="0" indent="0" algn="l">
               <a:lnSpc>
                 <a:spcPts val="2100"/>
               </a:lnSpc>
@@ -2944,7 +2931,7 @@
           <a:bodyPr wrap="square" lIns="0" tIns="0" rIns="0" bIns="0" rtlCol="0" anchor="t"/>
           <a:lstStyle/>
           <a:p>
-            <a:pPr algn="l" indent="0" marL="0">
+            <a:pPr marL="0" indent="0" algn="l">
               <a:lnSpc>
                 <a:spcPts val="2050"/>
               </a:lnSpc>
@@ -2986,7 +2973,7 @@
           <a:bodyPr wrap="none" lIns="0" tIns="0" rIns="0" bIns="0" rtlCol="0" anchor="t"/>
           <a:lstStyle/>
           <a:p>
-            <a:pPr algn="l" marL="342900" indent="-342900">
+            <a:pPr marL="342900" indent="-342900" algn="l">
               <a:lnSpc>
                 <a:spcPts val="2100"/>
               </a:lnSpc>
@@ -3029,7 +3016,7 @@
           <a:bodyPr wrap="none" lIns="0" tIns="0" rIns="0" bIns="0" rtlCol="0" anchor="t"/>
           <a:lstStyle/>
           <a:p>
-            <a:pPr algn="l" marL="342900" indent="-342900">
+            <a:pPr marL="342900" indent="-342900" algn="l">
               <a:lnSpc>
                 <a:spcPts val="2100"/>
               </a:lnSpc>
@@ -3072,7 +3059,7 @@
           <a:bodyPr wrap="square" lIns="0" tIns="0" rIns="0" bIns="0" rtlCol="0" anchor="t"/>
           <a:lstStyle/>
           <a:p>
-            <a:pPr algn="l" marL="342900" indent="-342900">
+            <a:pPr marL="342900" indent="-342900" algn="l">
               <a:lnSpc>
                 <a:spcPts val="2100"/>
               </a:lnSpc>
@@ -3115,7 +3102,7 @@
           <a:bodyPr wrap="none" lIns="0" tIns="0" rIns="0" bIns="0" rtlCol="0" anchor="t"/>
           <a:lstStyle/>
           <a:p>
-            <a:pPr algn="l" marL="342900" indent="-342900">
+            <a:pPr marL="342900" indent="-342900" algn="l">
               <a:lnSpc>
                 <a:spcPts val="2100"/>
               </a:lnSpc>
@@ -3158,7 +3145,7 @@
           <a:bodyPr wrap="none" lIns="0" tIns="0" rIns="0" bIns="0" rtlCol="0" anchor="t"/>
           <a:lstStyle/>
           <a:p>
-            <a:pPr algn="l" marL="342900" indent="-342900">
+            <a:pPr marL="342900" indent="-342900" algn="l">
               <a:lnSpc>
                 <a:spcPts val="2100"/>
               </a:lnSpc>
@@ -3201,7 +3188,7 @@
           <a:bodyPr wrap="square" lIns="0" tIns="0" rIns="0" bIns="0" rtlCol="0" anchor="t"/>
           <a:lstStyle/>
           <a:p>
-            <a:pPr algn="l" marL="342900" indent="-342900">
+            <a:pPr marL="342900" indent="-342900" algn="l">
               <a:lnSpc>
                 <a:spcPts val="2100"/>
               </a:lnSpc>
@@ -3244,7 +3231,7 @@
           <a:bodyPr wrap="none" lIns="0" tIns="0" rIns="0" bIns="0" rtlCol="0" anchor="t"/>
           <a:lstStyle/>
           <a:p>
-            <a:pPr algn="l" indent="0" marL="0">
+            <a:pPr marL="0" indent="0" algn="l">
               <a:lnSpc>
                 <a:spcPts val="2100"/>
               </a:lnSpc>
@@ -3286,7 +3273,7 @@
           <a:bodyPr wrap="none" lIns="0" tIns="0" rIns="0" bIns="0" rtlCol="0" anchor="t"/>
           <a:lstStyle/>
           <a:p>
-            <a:pPr algn="l" indent="0" marL="0">
+            <a:pPr marL="0" indent="0" algn="l">
               <a:lnSpc>
                 <a:spcPts val="2100"/>
               </a:lnSpc>
@@ -3328,7 +3315,7 @@
           <a:bodyPr wrap="none" lIns="0" tIns="0" rIns="0" bIns="0" rtlCol="0" anchor="t"/>
           <a:lstStyle/>
           <a:p>
-            <a:pPr algn="l" indent="0" marL="0">
+            <a:pPr marL="0" indent="0" algn="l">
               <a:lnSpc>
                 <a:spcPts val="2100"/>
               </a:lnSpc>
@@ -3370,7 +3357,7 @@
           <a:bodyPr wrap="none" lIns="0" tIns="0" rIns="0" bIns="0" rtlCol="0" anchor="t"/>
           <a:lstStyle/>
           <a:p>
-            <a:pPr algn="l" indent="0" marL="0">
+            <a:pPr marL="0" indent="0" algn="l">
               <a:lnSpc>
                 <a:spcPts val="2100"/>
               </a:lnSpc>
@@ -3412,7 +3399,7 @@
           <a:bodyPr wrap="none" lIns="0" tIns="0" rIns="0" bIns="0" rtlCol="0" anchor="t"/>
           <a:lstStyle/>
           <a:p>
-            <a:pPr algn="l" indent="0" marL="0">
+            <a:pPr marL="0" indent="0" algn="l">
               <a:lnSpc>
                 <a:spcPts val="2100"/>
               </a:lnSpc>
@@ -3466,7 +3453,7 @@
         </p:nvSpPr>
         <p:spPr>
           <a:xfrm>
-            <a:off x="793790" y="675680"/>
+            <a:off x="762389" y="39031"/>
             <a:ext cx="5670590" cy="708779"/>
           </a:xfrm>
           <a:prstGeom prst="rect">
@@ -3479,7 +3466,7 @@
           <a:bodyPr wrap="none" lIns="0" tIns="0" rIns="0" bIns="0" rtlCol="0" anchor="t"/>
           <a:lstStyle/>
           <a:p>
-            <a:pPr algn="l" indent="0" marL="0">
+            <a:pPr marL="0" indent="0" algn="l">
               <a:lnSpc>
                 <a:spcPts val="5550"/>
               </a:lnSpc>
@@ -3508,8 +3495,8 @@
         </p:nvSpPr>
         <p:spPr>
           <a:xfrm>
-            <a:off x="793790" y="1838087"/>
-            <a:ext cx="4196358" cy="5715714"/>
+            <a:off x="762389" y="657329"/>
+            <a:ext cx="4196358" cy="6637138"/>
           </a:xfrm>
           <a:prstGeom prst="roundRect">
             <a:avLst>
@@ -3530,7 +3517,7 @@
         </p:nvSpPr>
         <p:spPr>
           <a:xfrm>
-            <a:off x="1020604" y="2064901"/>
+            <a:off x="857134" y="728005"/>
             <a:ext cx="680442" cy="680442"/>
           </a:xfrm>
           <a:prstGeom prst="roundRect">
@@ -3543,20 +3530,27 @@
           </a:solidFill>
           <a:ln/>
         </p:spPr>
+        <p:txBody>
+          <a:bodyPr/>
+          <a:lstStyle/>
+          <a:p>
+            <a:endParaRPr lang="es-PE" dirty="0"/>
+          </a:p>
+        </p:txBody>
       </p:sp>
       <p:pic>
         <p:nvPicPr>
-          <p:cNvPr id="5" name="Image 0" descr="preencoded.png">    </p:cNvPr>
+          <p:cNvPr id="5" name="Image 0" descr="preencoded.png"/>
           <p:cNvPicPr>
             <a:picLocks noChangeAspect="1"/>
           </p:cNvPicPr>
           <p:nvPr/>
         </p:nvPicPr>
         <p:blipFill>
-          <a:blip r:embed="rId1">
+          <a:blip r:embed="rId3">
             <a:extLst>
               <a:ext uri="{96DAC541-7B7A-43D3-8B79-37D633B846F1}">
-                <asvg:svgBlip xmlns:asvg="http://schemas.microsoft.com/office/drawing/2016/SVG/main" r:embed="rId2"/>
+                <asvg:svgBlip xmlns:asvg="http://schemas.microsoft.com/office/drawing/2016/SVG/main" r:embed="rId4"/>
               </a:ext>
             </a:extLst>
           </a:blip>
@@ -3566,7 +3560,7 @@
         </p:blipFill>
         <p:spPr>
           <a:xfrm>
-            <a:off x="1207770" y="2251948"/>
+            <a:off x="1074021" y="958006"/>
             <a:ext cx="306110" cy="306110"/>
           </a:xfrm>
           <a:prstGeom prst="rect">
@@ -3582,7 +3576,7 @@
         </p:nvSpPr>
         <p:spPr>
           <a:xfrm>
-            <a:off x="1020604" y="2972157"/>
+            <a:off x="1020604" y="1366108"/>
             <a:ext cx="3742730" cy="3629025"/>
           </a:xfrm>
           <a:prstGeom prst="rect">
@@ -3595,7 +3589,7 @@
           <a:bodyPr wrap="square" lIns="0" tIns="0" rIns="0" bIns="0" rtlCol="0" anchor="t"/>
           <a:lstStyle/>
           <a:p>
-            <a:pPr algn="l" indent="0" marL="0">
+            <a:pPr marL="0" indent="0" algn="l">
               <a:lnSpc>
                 <a:spcPts val="2850"/>
               </a:lnSpc>
@@ -3624,12 +3618,12 @@
         </p:nvSpPr>
         <p:spPr>
           <a:xfrm>
-            <a:off x="5216962" y="1838087"/>
-            <a:ext cx="4196358" cy="5715714"/>
+            <a:off x="5200723" y="657329"/>
+            <a:ext cx="4196358" cy="6637138"/>
           </a:xfrm>
           <a:prstGeom prst="roundRect">
             <a:avLst>
-              <a:gd name="adj" fmla="val 811"/>
+              <a:gd name="adj" fmla="val 0"/>
             </a:avLst>
           </a:prstGeom>
           <a:solidFill>
@@ -3637,6 +3631,13 @@
           </a:solidFill>
           <a:ln/>
         </p:spPr>
+        <p:txBody>
+          <a:bodyPr/>
+          <a:lstStyle/>
+          <a:p>
+            <a:endParaRPr lang="es-PE" dirty="0"/>
+          </a:p>
+        </p:txBody>
       </p:sp>
       <p:sp>
         <p:nvSpPr>
@@ -3646,7 +3647,7 @@
         </p:nvSpPr>
         <p:spPr>
           <a:xfrm>
-            <a:off x="5443776" y="2064901"/>
+            <a:off x="5256648" y="716738"/>
             <a:ext cx="680442" cy="680442"/>
           </a:xfrm>
           <a:prstGeom prst="roundRect">
@@ -3659,20 +3660,27 @@
           </a:solidFill>
           <a:ln/>
         </p:spPr>
+        <p:txBody>
+          <a:bodyPr/>
+          <a:lstStyle/>
+          <a:p>
+            <a:endParaRPr lang="es-PE" dirty="0"/>
+          </a:p>
+        </p:txBody>
       </p:sp>
       <p:pic>
         <p:nvPicPr>
-          <p:cNvPr id="9" name="Image 1" descr="preencoded.png">    </p:cNvPr>
+          <p:cNvPr id="9" name="Image 1" descr="preencoded.png"/>
           <p:cNvPicPr>
             <a:picLocks noChangeAspect="1"/>
           </p:cNvPicPr>
           <p:nvPr/>
         </p:nvPicPr>
         <p:blipFill>
-          <a:blip r:embed="rId3">
+          <a:blip r:embed="rId5">
             <a:extLst>
               <a:ext uri="{96DAC541-7B7A-43D3-8B79-37D633B846F1}">
-                <asvg:svgBlip xmlns:asvg="http://schemas.microsoft.com/office/drawing/2016/SVG/main" r:embed="rId4"/>
+                <asvg:svgBlip xmlns:asvg="http://schemas.microsoft.com/office/drawing/2016/SVG/main" r:embed="rId6"/>
               </a:ext>
             </a:extLst>
           </a:blip>
@@ -3682,7 +3690,7 @@
         </p:blipFill>
         <p:spPr>
           <a:xfrm>
-            <a:off x="5630942" y="2251948"/>
+            <a:off x="5443814" y="935133"/>
             <a:ext cx="306110" cy="306110"/>
           </a:xfrm>
           <a:prstGeom prst="rect">
@@ -3698,7 +3706,7 @@
         </p:nvSpPr>
         <p:spPr>
           <a:xfrm>
-            <a:off x="5443776" y="2972157"/>
+            <a:off x="5340586" y="1349309"/>
             <a:ext cx="3742730" cy="3991928"/>
           </a:xfrm>
           <a:prstGeom prst="rect">
@@ -3711,7 +3719,7 @@
           <a:bodyPr wrap="square" lIns="0" tIns="0" rIns="0" bIns="0" rtlCol="0" anchor="t"/>
           <a:lstStyle/>
           <a:p>
-            <a:pPr algn="l" indent="0" marL="0">
+            <a:pPr marL="0" indent="0" algn="l">
               <a:lnSpc>
                 <a:spcPts val="2850"/>
               </a:lnSpc>
@@ -3740,8 +3748,8 @@
         </p:nvSpPr>
         <p:spPr>
           <a:xfrm>
-            <a:off x="9640133" y="1838087"/>
-            <a:ext cx="4196358" cy="5715714"/>
+            <a:off x="9671653" y="610610"/>
+            <a:ext cx="4196358" cy="6637138"/>
           </a:xfrm>
           <a:prstGeom prst="roundRect">
             <a:avLst>
@@ -3762,7 +3770,7 @@
         </p:nvSpPr>
         <p:spPr>
           <a:xfrm>
-            <a:off x="9866948" y="2064901"/>
+            <a:off x="9740987" y="668867"/>
             <a:ext cx="680442" cy="680442"/>
           </a:xfrm>
           <a:prstGeom prst="roundRect">
@@ -3778,17 +3786,17 @@
       </p:sp>
       <p:pic>
         <p:nvPicPr>
-          <p:cNvPr id="13" name="Image 2" descr="preencoded.png">    </p:cNvPr>
+          <p:cNvPr id="13" name="Image 2" descr="preencoded.png"/>
           <p:cNvPicPr>
             <a:picLocks noChangeAspect="1"/>
           </p:cNvPicPr>
           <p:nvPr/>
         </p:nvPicPr>
         <p:blipFill>
-          <a:blip r:embed="rId5">
+          <a:blip r:embed="rId7">
             <a:extLst>
               <a:ext uri="{96DAC541-7B7A-43D3-8B79-37D633B846F1}">
-                <asvg:svgBlip xmlns:asvg="http://schemas.microsoft.com/office/drawing/2016/SVG/main" r:embed="rId6"/>
+                <asvg:svgBlip xmlns:asvg="http://schemas.microsoft.com/office/drawing/2016/SVG/main" r:embed="rId8"/>
               </a:ext>
             </a:extLst>
           </a:blip>
@@ -3798,7 +3806,7 @@
         </p:blipFill>
         <p:spPr>
           <a:xfrm>
-            <a:off x="10054114" y="2251948"/>
+            <a:off x="9928153" y="856033"/>
             <a:ext cx="306110" cy="306110"/>
           </a:xfrm>
           <a:prstGeom prst="rect">
@@ -3814,7 +3822,7 @@
         </p:nvSpPr>
         <p:spPr>
           <a:xfrm>
-            <a:off x="9866948" y="2972157"/>
+            <a:off x="9803349" y="1349309"/>
             <a:ext cx="3742730" cy="4354830"/>
           </a:xfrm>
           <a:prstGeom prst="rect">
@@ -3827,7 +3835,7 @@
           <a:bodyPr wrap="square" lIns="0" tIns="0" rIns="0" bIns="0" rtlCol="0" anchor="t"/>
           <a:lstStyle/>
           <a:p>
-            <a:pPr algn="l" indent="0" marL="0">
+            <a:pPr marL="0" indent="0" algn="l">
               <a:lnSpc>
                 <a:spcPts val="2850"/>
               </a:lnSpc>
@@ -3848,6 +3856,96 @@
           </a:p>
         </p:txBody>
       </p:sp>
+      <p:pic>
+        <p:nvPicPr>
+          <p:cNvPr id="16" name="Imagen 15">
+            <a:extLst>
+              <a:ext uri="{FF2B5EF4-FFF2-40B4-BE49-F238E27FC236}">
+                <a16:creationId xmlns:a16="http://schemas.microsoft.com/office/drawing/2014/main" id="{CF994A75-0FA0-9CA6-0C89-6977FF1513B0}"/>
+              </a:ext>
+            </a:extLst>
+          </p:cNvPr>
+          <p:cNvPicPr>
+            <a:picLocks noChangeAspect="1"/>
+          </p:cNvPicPr>
+          <p:nvPr/>
+        </p:nvPicPr>
+        <p:blipFill>
+          <a:blip r:embed="rId9"/>
+          <a:stretch>
+            <a:fillRect/>
+          </a:stretch>
+        </p:blipFill>
+        <p:spPr>
+          <a:xfrm>
+            <a:off x="883199" y="5097125"/>
+            <a:ext cx="4042952" cy="2504483"/>
+          </a:xfrm>
+          <a:prstGeom prst="rect">
+            <a:avLst/>
+          </a:prstGeom>
+        </p:spPr>
+      </p:pic>
+      <p:pic>
+        <p:nvPicPr>
+          <p:cNvPr id="18" name="Imagen 17">
+            <a:extLst>
+              <a:ext uri="{FF2B5EF4-FFF2-40B4-BE49-F238E27FC236}">
+                <a16:creationId xmlns:a16="http://schemas.microsoft.com/office/drawing/2014/main" id="{12132392-6AD0-8AA5-6C4A-E5514EAC7710}"/>
+              </a:ext>
+            </a:extLst>
+          </p:cNvPr>
+          <p:cNvPicPr>
+            <a:picLocks noChangeAspect="1"/>
+          </p:cNvPicPr>
+          <p:nvPr/>
+        </p:nvPicPr>
+        <p:blipFill>
+          <a:blip r:embed="rId10"/>
+          <a:stretch>
+            <a:fillRect/>
+          </a:stretch>
+        </p:blipFill>
+        <p:spPr>
+          <a:xfrm>
+            <a:off x="5365015" y="5456958"/>
+            <a:ext cx="3845892" cy="2461038"/>
+          </a:xfrm>
+          <a:prstGeom prst="rect">
+            <a:avLst/>
+          </a:prstGeom>
+        </p:spPr>
+      </p:pic>
+      <p:pic>
+        <p:nvPicPr>
+          <p:cNvPr id="20" name="Imagen 19">
+            <a:extLst>
+              <a:ext uri="{FF2B5EF4-FFF2-40B4-BE49-F238E27FC236}">
+                <a16:creationId xmlns:a16="http://schemas.microsoft.com/office/drawing/2014/main" id="{DCFC0495-16E9-6BFD-F90B-0C223F6534F4}"/>
+              </a:ext>
+            </a:extLst>
+          </p:cNvPr>
+          <p:cNvPicPr>
+            <a:picLocks noChangeAspect="1"/>
+          </p:cNvPicPr>
+          <p:nvPr/>
+        </p:nvPicPr>
+        <p:blipFill>
+          <a:blip r:embed="rId11"/>
+          <a:stretch>
+            <a:fillRect/>
+          </a:stretch>
+        </p:blipFill>
+        <p:spPr>
+          <a:xfrm>
+            <a:off x="9928153" y="5767251"/>
+            <a:ext cx="3710134" cy="2226080"/>
+          </a:xfrm>
+          <a:prstGeom prst="rect">
+            <a:avLst/>
+          </a:prstGeom>
+        </p:spPr>
+      </p:pic>
     </p:spTree>
   </p:cSld>
   <p:clrMapOvr>
@@ -3894,7 +3992,7 @@
           <a:bodyPr wrap="none" lIns="0" tIns="0" rIns="0" bIns="0" rtlCol="0" anchor="t"/>
           <a:lstStyle/>
           <a:p>
-            <a:pPr algn="l" indent="0" marL="0">
+            <a:pPr marL="0" indent="0" algn="l">
               <a:lnSpc>
                 <a:spcPts val="5000"/>
               </a:lnSpc>
@@ -3939,17 +4037,17 @@
       </p:sp>
       <p:pic>
         <p:nvPicPr>
-          <p:cNvPr id="4" name="Image 0" descr="preencoded.png">    </p:cNvPr>
+          <p:cNvPr id="4" name="Image 0" descr="preencoded.png"/>
           <p:cNvPicPr>
             <a:picLocks noChangeAspect="1"/>
           </p:cNvPicPr>
           <p:nvPr/>
         </p:nvPicPr>
         <p:blipFill>
-          <a:blip r:embed="rId1">
+          <a:blip r:embed="rId3">
             <a:extLst>
               <a:ext uri="{96DAC541-7B7A-43D3-8B79-37D633B846F1}">
-                <asvg:svgBlip xmlns:asvg="http://schemas.microsoft.com/office/drawing/2016/SVG/main" r:embed="rId2"/>
+                <asvg:svgBlip xmlns:asvg="http://schemas.microsoft.com/office/drawing/2016/SVG/main" r:embed="rId4"/>
               </a:ext>
             </a:extLst>
           </a:blip>
@@ -3988,7 +4086,7 @@
           <a:bodyPr wrap="square" lIns="0" tIns="0" rIns="0" bIns="0" rtlCol="0" anchor="t"/>
           <a:lstStyle/>
           <a:p>
-            <a:pPr algn="l" indent="0" marL="0">
+            <a:pPr marL="0" indent="0" algn="l">
               <a:lnSpc>
                 <a:spcPts val="2500"/>
               </a:lnSpc>
@@ -4005,12 +4103,6 @@
               </a:rPr>
               <a:t>Los resultados concuerdan con el análisis teórico de la literatura (Cormen et al., </a:t>
             </a:r>
-            <a:pPr algn="l" indent="0" marL="0">
-              <a:lnSpc>
-                <a:spcPts val="2500"/>
-              </a:lnSpc>
-              <a:buNone/>
-            </a:pPr>
             <a:r>
               <a:rPr lang="en-US" sz="2000" b="1" i="1" dirty="0">
                 <a:solidFill>
@@ -4022,12 +4114,6 @@
               </a:rPr>
               <a:t>Introduction to Algorithms</a:t>
             </a:r>
-            <a:pPr algn="l" indent="0" marL="0">
-              <a:lnSpc>
-                <a:spcPts val="2500"/>
-              </a:lnSpc>
-              <a:buNone/>
-            </a:pPr>
             <a:r>
               <a:rPr lang="en-US" sz="2000" b="1" dirty="0">
                 <a:solidFill>
@@ -4039,12 +4125,6 @@
               </a:rPr>
               <a:t>, 2009; Sedgewick &amp; Wayne, </a:t>
             </a:r>
-            <a:pPr algn="l" indent="0" marL="0">
-              <a:lnSpc>
-                <a:spcPts val="2500"/>
-              </a:lnSpc>
-              <a:buNone/>
-            </a:pPr>
             <a:r>
               <a:rPr lang="en-US" sz="2000" b="1" i="1" dirty="0">
                 <a:solidFill>
@@ -4056,12 +4136,6 @@
               </a:rPr>
               <a:t>Algorithms</a:t>
             </a:r>
-            <a:pPr algn="l" indent="0" marL="0">
-              <a:lnSpc>
-                <a:spcPts val="2500"/>
-              </a:lnSpc>
-              <a:buNone/>
-            </a:pPr>
             <a:r>
               <a:rPr lang="en-US" sz="2000" b="1" dirty="0">
                 <a:solidFill>
@@ -4101,17 +4175,17 @@
       </p:sp>
       <p:pic>
         <p:nvPicPr>
-          <p:cNvPr id="7" name="Image 1" descr="preencoded.png">    </p:cNvPr>
+          <p:cNvPr id="7" name="Image 1" descr="preencoded.png"/>
           <p:cNvPicPr>
             <a:picLocks noChangeAspect="1"/>
           </p:cNvPicPr>
           <p:nvPr/>
         </p:nvPicPr>
         <p:blipFill>
-          <a:blip r:embed="rId3">
+          <a:blip r:embed="rId5">
             <a:extLst>
               <a:ext uri="{96DAC541-7B7A-43D3-8B79-37D633B846F1}">
-                <asvg:svgBlip xmlns:asvg="http://schemas.microsoft.com/office/drawing/2016/SVG/main" r:embed="rId4"/>
+                <asvg:svgBlip xmlns:asvg="http://schemas.microsoft.com/office/drawing/2016/SVG/main" r:embed="rId6"/>
               </a:ext>
             </a:extLst>
           </a:blip>
@@ -4150,7 +4224,7 @@
           <a:bodyPr wrap="square" lIns="0" tIns="0" rIns="0" bIns="0" rtlCol="0" anchor="t"/>
           <a:lstStyle/>
           <a:p>
-            <a:pPr algn="l" indent="0" marL="0">
+            <a:pPr marL="0" indent="0" algn="l">
               <a:lnSpc>
                 <a:spcPts val="2500"/>
               </a:lnSpc>
@@ -4192,7 +4266,7 @@
           <a:bodyPr wrap="square" lIns="0" tIns="0" rIns="0" bIns="0" rtlCol="0" anchor="t"/>
           <a:lstStyle/>
           <a:p>
-            <a:pPr algn="l" indent="0" marL="0">
+            <a:pPr marL="0" indent="0" algn="l">
               <a:lnSpc>
                 <a:spcPts val="2550"/>
               </a:lnSpc>
@@ -4279,7 +4353,7 @@
           <a:bodyPr wrap="none" lIns="0" tIns="0" rIns="0" bIns="0" rtlCol="0" anchor="t"/>
           <a:lstStyle/>
           <a:p>
-            <a:pPr algn="l" indent="0" marL="0">
+            <a:pPr marL="0" indent="0" algn="l">
               <a:lnSpc>
                 <a:spcPts val="4700"/>
               </a:lnSpc>
@@ -4321,7 +4395,7 @@
           <a:bodyPr wrap="square" lIns="0" tIns="0" rIns="0" bIns="0" rtlCol="0" anchor="t"/>
           <a:lstStyle/>
           <a:p>
-            <a:pPr algn="l" indent="0" marL="0">
+            <a:pPr marL="0" indent="0" algn="l">
               <a:lnSpc>
                 <a:spcPts val="3750"/>
               </a:lnSpc>
@@ -4338,12 +4412,6 @@
               </a:rPr>
               <a:t>Merge Sort es una excelente opción cuando se requiere estabilidad en la ordenación, ya que conserva el orden relativo de los elementos iguales. Además, su rendimiento consistente de </a:t>
             </a:r>
-            <a:pPr algn="l" indent="0" marL="0">
-              <a:lnSpc>
-                <a:spcPts val="3750"/>
-              </a:lnSpc>
-              <a:buNone/>
-            </a:pPr>
             <a:r>
               <a:rPr lang="en-US" sz="3000" b="1" i="1" dirty="0">
                 <a:solidFill>
@@ -4355,12 +4423,6 @@
               </a:rPr>
               <a:t>O(n⋅log⁡n),  </a:t>
             </a:r>
-            <a:pPr algn="l" indent="0" marL="0">
-              <a:lnSpc>
-                <a:spcPts val="3750"/>
-              </a:lnSpc>
-              <a:buNone/>
-            </a:pPr>
             <a:r>
               <a:rPr lang="en-US" sz="3000" b="1" dirty="0">
                 <a:solidFill>
@@ -4397,7 +4459,7 @@
           <a:bodyPr wrap="square" lIns="0" tIns="0" rIns="0" bIns="0" rtlCol="0" anchor="t"/>
           <a:lstStyle/>
           <a:p>
-            <a:pPr algn="l" indent="0" marL="0">
+            <a:pPr marL="0" indent="0" algn="l">
               <a:lnSpc>
                 <a:spcPts val="3750"/>
               </a:lnSpc>
@@ -4719,4 +4781,299 @@
     </a:ext>
   </a:extLst>
 </a:theme>
+</file>
+
+<file path=ppt/theme/theme2.xml><?xml version="1.0" encoding="utf-8"?>
+<a:theme xmlns:a="http://schemas.openxmlformats.org/drawingml/2006/main" name="Tema de Office">
+  <a:themeElements>
+    <a:clrScheme name="Office">
+      <a:dk1>
+        <a:sysClr val="windowText" lastClr="000000"/>
+      </a:dk1>
+      <a:lt1>
+        <a:sysClr val="window" lastClr="FFFFFF"/>
+      </a:lt1>
+      <a:dk2>
+        <a:srgbClr val="44546A"/>
+      </a:dk2>
+      <a:lt2>
+        <a:srgbClr val="E7E6E6"/>
+      </a:lt2>
+      <a:accent1>
+        <a:srgbClr val="4472C4"/>
+      </a:accent1>
+      <a:accent2>
+        <a:srgbClr val="ED7D31"/>
+      </a:accent2>
+      <a:accent3>
+        <a:srgbClr val="A5A5A5"/>
+      </a:accent3>
+      <a:accent4>
+        <a:srgbClr val="FFC000"/>
+      </a:accent4>
+      <a:accent5>
+        <a:srgbClr val="5B9BD5"/>
+      </a:accent5>
+      <a:accent6>
+        <a:srgbClr val="70AD47"/>
+      </a:accent6>
+      <a:hlink>
+        <a:srgbClr val="0563C1"/>
+      </a:hlink>
+      <a:folHlink>
+        <a:srgbClr val="954F72"/>
+      </a:folHlink>
+    </a:clrScheme>
+    <a:fontScheme name="Office">
+      <a:majorFont>
+        <a:latin typeface="Calibri Light" panose="020F0302020204030204"/>
+        <a:ea typeface=""/>
+        <a:cs typeface=""/>
+        <a:font script="Jpan" typeface="游ゴシック Light"/>
+        <a:font script="Hang" typeface="맑은 고딕"/>
+        <a:font script="Hans" typeface="等线 Light"/>
+        <a:font script="Hant" typeface="新細明體"/>
+        <a:font script="Arab" typeface="Times New Roman"/>
+        <a:font script="Hebr" typeface="Times New Roman"/>
+        <a:font script="Thai" typeface="Angsana New"/>
+        <a:font script="Ethi" typeface="Nyala"/>
+        <a:font script="Beng" typeface="Vrinda"/>
+        <a:font script="Gujr" typeface="Shruti"/>
+        <a:font script="Khmr" typeface="MoolBoran"/>
+        <a:font script="Knda" typeface="Tunga"/>
+        <a:font script="Guru" typeface="Raavi"/>
+        <a:font script="Cans" typeface="Euphemia"/>
+        <a:font script="Cher" typeface="Plantagenet Cherokee"/>
+        <a:font script="Yiii" typeface="Microsoft Yi Baiti"/>
+        <a:font script="Tibt" typeface="Microsoft Himalaya"/>
+        <a:font script="Thaa" typeface="MV Boli"/>
+        <a:font script="Deva" typeface="Mangal"/>
+        <a:font script="Telu" typeface="Gautami"/>
+        <a:font script="Taml" typeface="Latha"/>
+        <a:font script="Syrc" typeface="Estrangelo Edessa"/>
+        <a:font script="Orya" typeface="Kalinga"/>
+        <a:font script="Mlym" typeface="Kartika"/>
+        <a:font script="Laoo" typeface="DokChampa"/>
+        <a:font script="Sinh" typeface="Iskoola Pota"/>
+        <a:font script="Mong" typeface="Mongolian Baiti"/>
+        <a:font script="Viet" typeface="Times New Roman"/>
+        <a:font script="Uigh" typeface="Microsoft Uighur"/>
+        <a:font script="Geor" typeface="Sylfaen"/>
+        <a:font script="Armn" typeface="Arial"/>
+        <a:font script="Bugi" typeface="Leelawadee UI"/>
+        <a:font script="Bopo" typeface="Microsoft JhengHei"/>
+        <a:font script="Java" typeface="Javanese Text"/>
+        <a:font script="Lisu" typeface="Segoe UI"/>
+        <a:font script="Mymr" typeface="Myanmar Text"/>
+        <a:font script="Nkoo" typeface="Ebrima"/>
+        <a:font script="Olck" typeface="Nirmala UI"/>
+        <a:font script="Osma" typeface="Ebrima"/>
+        <a:font script="Phag" typeface="Phagspa"/>
+        <a:font script="Syrn" typeface="Estrangelo Edessa"/>
+        <a:font script="Syrj" typeface="Estrangelo Edessa"/>
+        <a:font script="Syre" typeface="Estrangelo Edessa"/>
+        <a:font script="Sora" typeface="Nirmala UI"/>
+        <a:font script="Tale" typeface="Microsoft Tai Le"/>
+        <a:font script="Talu" typeface="Microsoft New Tai Lue"/>
+        <a:font script="Tfng" typeface="Ebrima"/>
+      </a:majorFont>
+      <a:minorFont>
+        <a:latin typeface="Calibri" panose="020F0502020204030204"/>
+        <a:ea typeface=""/>
+        <a:cs typeface=""/>
+        <a:font script="Jpan" typeface="游ゴシック"/>
+        <a:font script="Hang" typeface="맑은 고딕"/>
+        <a:font script="Hans" typeface="等线"/>
+        <a:font script="Hant" typeface="新細明體"/>
+        <a:font script="Arab" typeface="Arial"/>
+        <a:font script="Hebr" typeface="Arial"/>
+        <a:font script="Thai" typeface="Cordia New"/>
+        <a:font script="Ethi" typeface="Nyala"/>
+        <a:font script="Beng" typeface="Vrinda"/>
+        <a:font script="Gujr" typeface="Shruti"/>
+        <a:font script="Khmr" typeface="DaunPenh"/>
+        <a:font script="Knda" typeface="Tunga"/>
+        <a:font script="Guru" typeface="Raavi"/>
+        <a:font script="Cans" typeface="Euphemia"/>
+        <a:font script="Cher" typeface="Plantagenet Cherokee"/>
+        <a:font script="Yiii" typeface="Microsoft Yi Baiti"/>
+        <a:font script="Tibt" typeface="Microsoft Himalaya"/>
+        <a:font script="Thaa" typeface="MV Boli"/>
+        <a:font script="Deva" typeface="Mangal"/>
+        <a:font script="Telu" typeface="Gautami"/>
+        <a:font script="Taml" typeface="Latha"/>
+        <a:font script="Syrc" typeface="Estrangelo Edessa"/>
+        <a:font script="Orya" typeface="Kalinga"/>
+        <a:font script="Mlym" typeface="Kartika"/>
+        <a:font script="Laoo" typeface="DokChampa"/>
+        <a:font script="Sinh" typeface="Iskoola Pota"/>
+        <a:font script="Mong" typeface="Mongolian Baiti"/>
+        <a:font script="Viet" typeface="Arial"/>
+        <a:font script="Uigh" typeface="Microsoft Uighur"/>
+        <a:font script="Geor" typeface="Sylfaen"/>
+        <a:font script="Armn" typeface="Arial"/>
+        <a:font script="Bugi" typeface="Leelawadee UI"/>
+        <a:font script="Bopo" typeface="Microsoft JhengHei"/>
+        <a:font script="Java" typeface="Javanese Text"/>
+        <a:font script="Lisu" typeface="Segoe UI"/>
+        <a:font script="Mymr" typeface="Myanmar Text"/>
+        <a:font script="Nkoo" typeface="Ebrima"/>
+        <a:font script="Olck" typeface="Nirmala UI"/>
+        <a:font script="Osma" typeface="Ebrima"/>
+        <a:font script="Phag" typeface="Phagspa"/>
+        <a:font script="Syrn" typeface="Estrangelo Edessa"/>
+        <a:font script="Syrj" typeface="Estrangelo Edessa"/>
+        <a:font script="Syre" typeface="Estrangelo Edessa"/>
+        <a:font script="Sora" typeface="Nirmala UI"/>
+        <a:font script="Tale" typeface="Microsoft Tai Le"/>
+        <a:font script="Talu" typeface="Microsoft New Tai Lue"/>
+        <a:font script="Tfng" typeface="Ebrima"/>
+      </a:minorFont>
+    </a:fontScheme>
+    <a:fmtScheme name="Office">
+      <a:fillStyleLst>
+        <a:solidFill>
+          <a:schemeClr val="phClr"/>
+        </a:solidFill>
+        <a:gradFill rotWithShape="1">
+          <a:gsLst>
+            <a:gs pos="0">
+              <a:schemeClr val="phClr">
+                <a:lumMod val="110000"/>
+                <a:satMod val="105000"/>
+                <a:tint val="67000"/>
+              </a:schemeClr>
+            </a:gs>
+            <a:gs pos="50000">
+              <a:schemeClr val="phClr">
+                <a:lumMod val="105000"/>
+                <a:satMod val="103000"/>
+                <a:tint val="73000"/>
+              </a:schemeClr>
+            </a:gs>
+            <a:gs pos="100000">
+              <a:schemeClr val="phClr">
+                <a:lumMod val="105000"/>
+                <a:satMod val="109000"/>
+                <a:tint val="81000"/>
+              </a:schemeClr>
+            </a:gs>
+          </a:gsLst>
+          <a:lin ang="5400000" scaled="0"/>
+        </a:gradFill>
+        <a:gradFill rotWithShape="1">
+          <a:gsLst>
+            <a:gs pos="0">
+              <a:schemeClr val="phClr">
+                <a:satMod val="103000"/>
+                <a:lumMod val="102000"/>
+                <a:tint val="94000"/>
+              </a:schemeClr>
+            </a:gs>
+            <a:gs pos="50000">
+              <a:schemeClr val="phClr">
+                <a:satMod val="110000"/>
+                <a:lumMod val="100000"/>
+                <a:shade val="100000"/>
+              </a:schemeClr>
+            </a:gs>
+            <a:gs pos="100000">
+              <a:schemeClr val="phClr">
+                <a:lumMod val="99000"/>
+                <a:satMod val="120000"/>
+                <a:shade val="78000"/>
+              </a:schemeClr>
+            </a:gs>
+          </a:gsLst>
+          <a:lin ang="5400000" scaled="0"/>
+        </a:gradFill>
+      </a:fillStyleLst>
+      <a:lnStyleLst>
+        <a:ln w="6350" cap="flat" cmpd="sng" algn="ctr">
+          <a:solidFill>
+            <a:schemeClr val="phClr"/>
+          </a:solidFill>
+          <a:prstDash val="solid"/>
+          <a:miter lim="800000"/>
+        </a:ln>
+        <a:ln w="12700" cap="flat" cmpd="sng" algn="ctr">
+          <a:solidFill>
+            <a:schemeClr val="phClr"/>
+          </a:solidFill>
+          <a:prstDash val="solid"/>
+          <a:miter lim="800000"/>
+        </a:ln>
+        <a:ln w="19050" cap="flat" cmpd="sng" algn="ctr">
+          <a:solidFill>
+            <a:schemeClr val="phClr"/>
+          </a:solidFill>
+          <a:prstDash val="solid"/>
+          <a:miter lim="800000"/>
+        </a:ln>
+      </a:lnStyleLst>
+      <a:effectStyleLst>
+        <a:effectStyle>
+          <a:effectLst/>
+        </a:effectStyle>
+        <a:effectStyle>
+          <a:effectLst/>
+        </a:effectStyle>
+        <a:effectStyle>
+          <a:effectLst>
+            <a:outerShdw blurRad="57150" dist="19050" dir="5400000" algn="ctr" rotWithShape="0">
+              <a:srgbClr val="000000">
+                <a:alpha val="63000"/>
+              </a:srgbClr>
+            </a:outerShdw>
+          </a:effectLst>
+        </a:effectStyle>
+      </a:effectStyleLst>
+      <a:bgFillStyleLst>
+        <a:solidFill>
+          <a:schemeClr val="phClr"/>
+        </a:solidFill>
+        <a:solidFill>
+          <a:schemeClr val="phClr">
+            <a:tint val="95000"/>
+            <a:satMod val="170000"/>
+          </a:schemeClr>
+        </a:solidFill>
+        <a:gradFill rotWithShape="1">
+          <a:gsLst>
+            <a:gs pos="0">
+              <a:schemeClr val="phClr">
+                <a:tint val="93000"/>
+                <a:satMod val="150000"/>
+                <a:shade val="98000"/>
+                <a:lumMod val="102000"/>
+              </a:schemeClr>
+            </a:gs>
+            <a:gs pos="50000">
+              <a:schemeClr val="phClr">
+                <a:tint val="98000"/>
+                <a:satMod val="130000"/>
+                <a:shade val="90000"/>
+                <a:lumMod val="103000"/>
+              </a:schemeClr>
+            </a:gs>
+            <a:gs pos="100000">
+              <a:schemeClr val="phClr">
+                <a:shade val="63000"/>
+                <a:satMod val="120000"/>
+              </a:schemeClr>
+            </a:gs>
+          </a:gsLst>
+          <a:lin ang="5400000" scaled="0"/>
+        </a:gradFill>
+      </a:bgFillStyleLst>
+    </a:fmtScheme>
+  </a:themeElements>
+  <a:objectDefaults/>
+  <a:extraClrSchemeLst/>
+  <a:extLst>
+    <a:ext uri="{05A4C25C-085E-4340-85A3-A5531E510DB2}">
+      <thm15:themeFamily xmlns:thm15="http://schemas.microsoft.com/office/thememl/2012/main" name="Office Theme" id="{62F939B6-93AF-4DB8-9C6B-D6C7DFDC589F}" vid="{4A3C46E8-61CC-4603-A589-7422A47A8E4A}"/>
+    </a:ext>
+  </a:extLst>
+</a:theme>
 </file>
</xml_diff>